<commit_message>
Update nguồn tham khảo
Update nguồn tham khảo
</commit_message>
<xml_diff>
--- a/training/MediaplayerApp/AppMusic.pptx
+++ b/training/MediaplayerApp/AppMusic.pptx
@@ -5,7 +5,7 @@
     <p:sldMasterId id="2147483648" r:id="rId1"/>
   </p:sldMasterIdLst>
   <p:notesMasterIdLst>
-    <p:notesMasterId r:id="rId11"/>
+    <p:notesMasterId r:id="rId12"/>
   </p:notesMasterIdLst>
   <p:sldIdLst>
     <p:sldId id="680" r:id="rId2"/>
@@ -15,13 +15,14 @@
     <p:sldId id="718" r:id="rId6"/>
     <p:sldId id="723" r:id="rId7"/>
     <p:sldId id="719" r:id="rId8"/>
-    <p:sldId id="724" r:id="rId9"/>
-    <p:sldId id="721" r:id="rId10"/>
+    <p:sldId id="725" r:id="rId9"/>
+    <p:sldId id="724" r:id="rId10"/>
+    <p:sldId id="721" r:id="rId11"/>
   </p:sldIdLst>
   <p:sldSz cx="12192000" cy="6858000"/>
   <p:notesSz cx="6858000" cy="9144000"/>
   <p:custDataLst>
-    <p:tags r:id="rId12"/>
+    <p:tags r:id="rId13"/>
   </p:custDataLst>
   <p:defaultTextStyle>
     <a:defPPr>
@@ -130,6 +131,7 @@
             <p14:sldId id="718"/>
             <p14:sldId id="723"/>
             <p14:sldId id="719"/>
+            <p14:sldId id="725"/>
             <p14:sldId id="724"/>
             <p14:sldId id="721"/>
           </p14:sldIdLst>
@@ -254,7 +256,7 @@
           <a:p>
             <a:fld id="{EC80E59F-BCDF-B547-B5F0-80FB1F5C3587}" type="datetimeFigureOut">
               <a:rPr lang="en-US" smtClean="0"/>
-              <a:t>11/16/2017</a:t>
+              <a:t>12/14/2017</a:t>
             </a:fld>
             <a:endParaRPr lang="en-US"/>
           </a:p>
@@ -825,7 +827,7 @@
           <a:p>
             <a:fld id="{A0402198-1F64-4C29-A39A-6449FC681DFE}" type="datetime1">
               <a:rPr lang="en-US" smtClean="0"/>
-              <a:t>11/16/2017</a:t>
+              <a:t>12/14/2017</a:t>
             </a:fld>
             <a:endParaRPr lang="en-US"/>
           </a:p>
@@ -1040,7 +1042,7 @@
           <a:p>
             <a:fld id="{C7392E1C-E738-46FC-BBDC-99DCFE136CD1}" type="datetime1">
               <a:rPr lang="en-US" smtClean="0"/>
-              <a:t>11/16/2017</a:t>
+              <a:t>12/14/2017</a:t>
             </a:fld>
             <a:endParaRPr lang="en-US"/>
           </a:p>
@@ -1258,7 +1260,7 @@
           <a:p>
             <a:fld id="{3469A188-72B9-45B7-B36A-D8157BE0E8DA}" type="datetime1">
               <a:rPr lang="en-US" smtClean="0"/>
-              <a:t>11/16/2017</a:t>
+              <a:t>12/14/2017</a:t>
             </a:fld>
             <a:endParaRPr lang="en-US"/>
           </a:p>
@@ -1483,7 +1485,7 @@
           <a:p>
             <a:fld id="{57D00853-0418-48B1-B306-CB141E6BA0CD}" type="datetime1">
               <a:rPr lang="en-US" smtClean="0"/>
-              <a:t>11/16/2017</a:t>
+              <a:t>12/14/2017</a:t>
             </a:fld>
             <a:endParaRPr lang="en-US"/>
           </a:p>
@@ -2043,7 +2045,7 @@
           <a:p>
             <a:fld id="{89E3A7F1-B45B-468D-9371-A8721D15CE93}" type="datetime1">
               <a:rPr lang="en-US" smtClean="0"/>
-              <a:t>11/16/2017</a:t>
+              <a:t>12/14/2017</a:t>
             </a:fld>
             <a:endParaRPr lang="en-US"/>
           </a:p>
@@ -2516,7 +2518,7 @@
           <a:p>
             <a:fld id="{5BA62228-A19F-449A-8618-7AC28C0B16EF}" type="datetime1">
               <a:rPr lang="en-US" smtClean="0"/>
-              <a:t>11/16/2017</a:t>
+              <a:t>12/14/2017</a:t>
             </a:fld>
             <a:endParaRPr lang="en-US"/>
           </a:p>
@@ -2761,7 +2763,7 @@
           <a:p>
             <a:fld id="{19F6D687-D7EE-4ACC-A6EA-87D5E3449757}" type="datetime1">
               <a:rPr lang="en-US" smtClean="0"/>
-              <a:t>11/16/2017</a:t>
+              <a:t>12/14/2017</a:t>
             </a:fld>
             <a:endParaRPr lang="en-US"/>
           </a:p>
@@ -2894,7 +2896,7 @@
           <a:p>
             <a:fld id="{7A086C6E-15B7-4614-9655-89A6044AEE4A}" type="datetime1">
               <a:rPr lang="en-US" smtClean="0"/>
-              <a:t>11/16/2017</a:t>
+              <a:t>12/14/2017</a:t>
             </a:fld>
             <a:endParaRPr lang="en-US"/>
           </a:p>
@@ -3174,7 +3176,7 @@
           <a:p>
             <a:fld id="{E6A0B438-073B-4A95-8862-ABC64D650870}" type="datetime1">
               <a:rPr lang="en-US" smtClean="0"/>
-              <a:t>11/16/2017</a:t>
+              <a:t>12/14/2017</a:t>
             </a:fld>
             <a:endParaRPr lang="en-US"/>
           </a:p>
@@ -3430,7 +3432,7 @@
           <a:p>
             <a:fld id="{DA14E809-786C-4D6A-9072-2204776426EE}" type="datetime1">
               <a:rPr lang="en-US" smtClean="0"/>
-              <a:t>11/16/2017</a:t>
+              <a:t>12/14/2017</a:t>
             </a:fld>
             <a:endParaRPr lang="en-US"/>
           </a:p>
@@ -3698,7 +3700,7 @@
           <a:p>
             <a:fld id="{1EED1621-9973-4F4E-8E8C-2C154D9EAEF4}" type="datetime1">
               <a:rPr lang="en-US" smtClean="0"/>
-              <a:t>11/16/2017</a:t>
+              <a:t>12/14/2017</a:t>
             </a:fld>
             <a:endParaRPr lang="en-US"/>
           </a:p>
@@ -4194,7 +4196,7 @@
             <a:fld id="{C4DD84D0-4EFB-435D-9115-4B796025CADE}" type="datetime1">
               <a:rPr lang="en-US" smtClean="0"/>
               <a:pPr/>
-              <a:t>11/16/2017</a:t>
+              <a:t>12/14/2017</a:t>
             </a:fld>
             <a:endParaRPr lang="en-US"/>
           </a:p>
@@ -4910,6 +4912,99 @@
 </p:sld>
 </file>
 
+<file path=ppt/slides/slide10.xml><?xml version="1.0" encoding="utf-8"?>
+<p:sld xmlns:a="http://schemas.openxmlformats.org/drawingml/2006/main" xmlns:r="http://schemas.openxmlformats.org/officeDocument/2006/relationships" xmlns:p="http://schemas.openxmlformats.org/presentationml/2006/main">
+  <p:cSld>
+    <p:spTree>
+      <p:nvGrpSpPr>
+        <p:cNvPr id="1" name=""/>
+        <p:cNvGrpSpPr/>
+        <p:nvPr/>
+      </p:nvGrpSpPr>
+      <p:grpSpPr>
+        <a:xfrm>
+          <a:off x="0" y="0"/>
+          <a:ext cx="0" cy="0"/>
+          <a:chOff x="0" y="0"/>
+          <a:chExt cx="0" cy="0"/>
+        </a:xfrm>
+      </p:grpSpPr>
+      <p:sp>
+        <p:nvSpPr>
+          <p:cNvPr id="3" name="TextBox 2"/>
+          <p:cNvSpPr txBox="1"/>
+          <p:nvPr/>
+        </p:nvSpPr>
+        <p:spPr>
+          <a:xfrm>
+            <a:off x="1283110" y="2138515"/>
+            <a:ext cx="9999405" cy="1200329"/>
+          </a:xfrm>
+          <a:prstGeom prst="rect">
+            <a:avLst/>
+          </a:prstGeom>
+          <a:noFill/>
+          <a:effectLst>
+            <a:outerShdw blurRad="76200" dir="13500000" sy="23000" kx="1200000" algn="br" rotWithShape="0">
+              <a:prstClr val="black">
+                <a:alpha val="20000"/>
+              </a:prstClr>
+            </a:outerShdw>
+            <a:reflection blurRad="6350" stA="50000" endA="300" endPos="90000" dir="5400000" sy="-100000" algn="bl" rotWithShape="0"/>
+          </a:effectLst>
+        </p:spPr>
+        <p:txBody>
+          <a:bodyPr wrap="square" rtlCol="0">
+            <a:spAutoFit/>
+          </a:bodyPr>
+          <a:lstStyle/>
+          <a:p>
+            <a:pPr algn="ctr"/>
+            <a:r>
+              <a:rPr lang="vi-VN" sz="3600" b="1" dirty="0" smtClean="0">
+                <a:solidFill>
+                  <a:schemeClr val="accent6">
+                    <a:lumMod val="75000"/>
+                  </a:schemeClr>
+                </a:solidFill>
+                <a:latin typeface="+mj-lt"/>
+              </a:rPr>
+              <a:t>CÁM ƠN THẦY VÀ CÁC BẠN ĐÃ LẮNG NGHE</a:t>
+            </a:r>
+            <a:endParaRPr lang="en-GB" sz="3600" b="1" dirty="0">
+              <a:solidFill>
+                <a:schemeClr val="accent6">
+                  <a:lumMod val="75000"/>
+                </a:schemeClr>
+              </a:solidFill>
+              <a:latin typeface="+mj-lt"/>
+            </a:endParaRPr>
+          </a:p>
+        </p:txBody>
+      </p:sp>
+    </p:spTree>
+    <p:extLst>
+      <p:ext uri="{BB962C8B-B14F-4D97-AF65-F5344CB8AC3E}">
+        <p14:creationId xmlns:p14="http://schemas.microsoft.com/office/powerpoint/2010/main" val="3376608731"/>
+      </p:ext>
+    </p:extLst>
+  </p:cSld>
+  <p:clrMapOvr>
+    <a:masterClrMapping/>
+  </p:clrMapOvr>
+  <p:transition spd="slow">
+    <p:push dir="u"/>
+  </p:transition>
+  <p:timing>
+    <p:tnLst>
+      <p:par>
+        <p:cTn id="1" dur="indefinite" restart="never" nodeType="tmRoot"/>
+      </p:par>
+    </p:tnLst>
+  </p:timing>
+</p:sld>
+</file>
+
 <file path=ppt/slides/slide2.xml><?xml version="1.0" encoding="utf-8"?>
 <p:sld xmlns:a="http://schemas.openxmlformats.org/drawingml/2006/main" xmlns:r="http://schemas.openxmlformats.org/officeDocument/2006/relationships" xmlns:p="http://schemas.openxmlformats.org/presentationml/2006/main">
   <p:cSld>
@@ -6510,8 +6605,8 @@
         </p:nvSpPr>
         <p:spPr>
           <a:xfrm>
-            <a:off x="1088922" y="2417199"/>
-            <a:ext cx="10515600" cy="1057275"/>
+            <a:off x="838200" y="352425"/>
+            <a:ext cx="10515600" cy="5325704"/>
           </a:xfrm>
         </p:spPr>
         <p:txBody>
@@ -6520,23 +6615,110 @@
           </a:bodyPr>
           <a:lstStyle/>
           <a:p>
-            <a:pPr algn="ctr"/>
-            <a:r>
-              <a:rPr lang="vi-VN" sz="4800" dirty="0"/>
-              <a:t>D</a:t>
-            </a:r>
-            <a:r>
-              <a:rPr lang="vi-VN" sz="4800" dirty="0" smtClean="0"/>
-              <a:t>EMO ứng dụng </a:t>
-            </a:r>
-            <a:endParaRPr lang="en-GB" sz="4800" dirty="0"/>
+            <a:r>
+              <a:rPr lang="vi-VN" dirty="0" smtClean="0"/>
+              <a:t>Nguồn tham khảo </a:t>
+            </a:r>
+            <a:r>
+              <a:rPr lang="vi-VN" dirty="0"/>
+              <a:t>:  </a:t>
+            </a:r>
+            <a:r>
+              <a:rPr lang="vi-VN" dirty="0">
+                <a:hlinkClick r:id="rId2"/>
+              </a:rPr>
+              <a:t>https://</a:t>
+            </a:r>
+            <a:r>
+              <a:rPr lang="vi-VN" dirty="0" smtClean="0">
+                <a:hlinkClick r:id="rId2"/>
+              </a:rPr>
+              <a:t>www.youtube.com/watch?v=1lSkr9anY6E</a:t>
+            </a:r>
+            <a:r>
+              <a:rPr lang="vi-VN" dirty="0" smtClean="0"/>
+              <a:t/>
+            </a:r>
+            <a:br>
+              <a:rPr lang="vi-VN" dirty="0" smtClean="0"/>
+            </a:br>
+            <a:r>
+              <a:rPr lang="vi-VN" dirty="0" smtClean="0"/>
+              <a:t>Khoa Pham Youtobe </a:t>
+            </a:r>
+            <a:r>
+              <a:rPr lang="en-GB" b="0" dirty="0" err="1"/>
+              <a:t>Lập</a:t>
+            </a:r>
+            <a:r>
+              <a:rPr lang="en-GB" b="0" dirty="0"/>
+              <a:t> </a:t>
+            </a:r>
+            <a:r>
+              <a:rPr lang="en-GB" b="0" dirty="0" err="1"/>
+              <a:t>trình</a:t>
+            </a:r>
+            <a:r>
+              <a:rPr lang="en-GB" b="0" dirty="0"/>
+              <a:t> Android A-Z - </a:t>
+            </a:r>
+            <a:r>
+              <a:rPr lang="en-GB" b="0" dirty="0" err="1"/>
+              <a:t>Bài</a:t>
+            </a:r>
+            <a:r>
+              <a:rPr lang="en-GB" b="0" dirty="0"/>
+              <a:t> </a:t>
+            </a:r>
+            <a:r>
+              <a:rPr lang="en-GB" b="0" dirty="0" smtClean="0"/>
+              <a:t>121</a:t>
+            </a:r>
+            <a:r>
+              <a:rPr lang="vi-VN" b="0" dirty="0" smtClean="0"/>
+              <a:t> -&gt; 127</a:t>
+            </a:r>
+            <a:r>
+              <a:rPr lang="en-GB" b="0" smtClean="0"/>
+              <a:t>: </a:t>
+            </a:r>
+            <a:r>
+              <a:rPr lang="en-GB" b="0" dirty="0"/>
+              <a:t>Media App </a:t>
+            </a:r>
+            <a:r>
+              <a:rPr lang="en-GB" b="0"/>
+              <a:t>Music </a:t>
+            </a:r>
+            <a:r>
+              <a:rPr lang="en-GB" b="0" dirty="0"/>
+              <a:t/>
+            </a:r>
+            <a:br>
+              <a:rPr lang="en-GB" b="0" dirty="0"/>
+            </a:br>
+            <a:r>
+              <a:rPr lang="vi-VN" dirty="0" smtClean="0"/>
+              <a:t/>
+            </a:r>
+            <a:br>
+              <a:rPr lang="vi-VN" dirty="0" smtClean="0"/>
+            </a:br>
+            <a:r>
+              <a:rPr lang="vi-VN" dirty="0"/>
+              <a:t/>
+            </a:r>
+            <a:br>
+              <a:rPr lang="vi-VN" dirty="0"/>
+            </a:br>
+            <a:endParaRPr lang="en-GB" dirty="0"/>
           </a:p>
         </p:txBody>
       </p:sp>
     </p:spTree>
     <p:extLst>
       <p:ext uri="{BB962C8B-B14F-4D97-AF65-F5344CB8AC3E}">
-        <p14:creationId xmlns:p14="http://schemas.microsoft.com/office/powerpoint/2010/main" val="3427706034"/>
+        <p14:creationId xmlns:p14="http://schemas.microsoft.com/office/powerpoint/2010/main" val="174525286"/>
       </p:ext>
     </p:extLst>
   </p:cSld>
@@ -6546,13 +6728,6 @@
   <p:transition spd="slow">
     <p:push dir="u"/>
   </p:transition>
-  <p:timing>
-    <p:tnLst>
-      <p:par>
-        <p:cTn id="1" dur="indefinite" restart="never" nodeType="tmRoot"/>
-      </p:par>
-    </p:tnLst>
-  </p:timing>
 </p:sld>
 </file>
 
@@ -6575,61 +6750,43 @@
       </p:grpSpPr>
       <p:sp>
         <p:nvSpPr>
-          <p:cNvPr id="3" name="TextBox 2"/>
-          <p:cNvSpPr txBox="1"/>
-          <p:nvPr/>
-        </p:nvSpPr>
-        <p:spPr>
-          <a:xfrm>
-            <a:off x="1283110" y="2138515"/>
-            <a:ext cx="9999405" cy="1200329"/>
-          </a:xfrm>
-          <a:prstGeom prst="rect">
-            <a:avLst/>
-          </a:prstGeom>
-          <a:noFill/>
-          <a:effectLst>
-            <a:outerShdw blurRad="76200" dir="13500000" sy="23000" kx="1200000" algn="br" rotWithShape="0">
-              <a:prstClr val="black">
-                <a:alpha val="20000"/>
-              </a:prstClr>
-            </a:outerShdw>
-            <a:reflection blurRad="6350" stA="50000" endA="300" endPos="90000" dir="5400000" sy="-100000" algn="bl" rotWithShape="0"/>
-          </a:effectLst>
-        </p:spPr>
-        <p:txBody>
-          <a:bodyPr wrap="square" rtlCol="0">
-            <a:spAutoFit/>
+          <p:cNvPr id="2" name="Title 1"/>
+          <p:cNvSpPr>
+            <a:spLocks noGrp="1"/>
+          </p:cNvSpPr>
+          <p:nvPr>
+            <p:ph type="title"/>
+          </p:nvPr>
+        </p:nvSpPr>
+        <p:spPr>
+          <a:xfrm>
+            <a:off x="1088922" y="2417199"/>
+            <a:ext cx="10515600" cy="1057275"/>
+          </a:xfrm>
+        </p:spPr>
+        <p:txBody>
+          <a:bodyPr>
+            <a:normAutofit/>
           </a:bodyPr>
           <a:lstStyle/>
           <a:p>
             <a:pPr algn="ctr"/>
             <a:r>
-              <a:rPr lang="vi-VN" sz="3600" b="1" dirty="0" smtClean="0">
-                <a:solidFill>
-                  <a:schemeClr val="accent6">
-                    <a:lumMod val="75000"/>
-                  </a:schemeClr>
-                </a:solidFill>
-                <a:latin typeface="+mj-lt"/>
-              </a:rPr>
-              <a:t>CÁM ƠN THẦY VÀ CÁC BẠN ĐÃ LẮNG NGHE</a:t>
-            </a:r>
-            <a:endParaRPr lang="en-GB" sz="3600" b="1" dirty="0">
-              <a:solidFill>
-                <a:schemeClr val="accent6">
-                  <a:lumMod val="75000"/>
-                </a:schemeClr>
-              </a:solidFill>
-              <a:latin typeface="+mj-lt"/>
-            </a:endParaRPr>
+              <a:rPr lang="vi-VN" sz="4800" dirty="0"/>
+              <a:t>D</a:t>
+            </a:r>
+            <a:r>
+              <a:rPr lang="vi-VN" sz="4800" dirty="0" smtClean="0"/>
+              <a:t>EMO ứng dụng </a:t>
+            </a:r>
+            <a:endParaRPr lang="en-GB" sz="4800" dirty="0"/>
           </a:p>
         </p:txBody>
       </p:sp>
     </p:spTree>
     <p:extLst>
       <p:ext uri="{BB962C8B-B14F-4D97-AF65-F5344CB8AC3E}">
-        <p14:creationId xmlns:p14="http://schemas.microsoft.com/office/powerpoint/2010/main" val="3376608731"/>
+        <p14:creationId xmlns:p14="http://schemas.microsoft.com/office/powerpoint/2010/main" val="3427706034"/>
       </p:ext>
     </p:extLst>
   </p:cSld>

</xml_diff>